<commit_message>
dashboard and dashboard api's are done.
</commit_message>
<xml_diff>
--- a/design/DB.pptx
+++ b/design/DB.pptx
@@ -105,6 +105,11 @@
       </a:defRPr>
     </a:lvl9pPr>
   </p:defaultTextStyle>
+  <p:extLst>
+    <p:ext uri="{EFAFB233-063F-42B5-8137-9DF3F51BA10A}">
+      <p15:sldGuideLst xmlns:p15="http://schemas.microsoft.com/office/powerpoint/2012/main"/>
+    </p:ext>
+  </p:extLst>
 </p:presentation>
 </file>
 
@@ -3154,14 +3159,14 @@
           <p:nvPr>
             <p:extLst>
               <p:ext uri="{D42A27DB-BD31-4B8C-83A1-F6EECF244321}">
-                <p14:modId xmlns:p14="http://schemas.microsoft.com/office/powerpoint/2010/main" val="1931259172"/>
+                <p14:modId xmlns:p14="http://schemas.microsoft.com/office/powerpoint/2010/main" val="1542477716"/>
               </p:ext>
             </p:extLst>
           </p:nvPr>
         </p:nvGraphicFramePr>
         <p:xfrm>
-          <a:off x="3065696" y="221145"/>
-          <a:ext cx="2899664" cy="6477000"/>
+          <a:off x="3065696" y="121920"/>
+          <a:ext cx="2899664" cy="6736080"/>
         </p:xfrm>
         <a:graphic>
           <a:graphicData uri="http://schemas.openxmlformats.org/drawingml/2006/table">
@@ -3283,6 +3288,41 @@
                 <a:extLst>
                   <a:ext uri="{0D108BD9-81ED-4DB2-BD59-A6C34878D82A}">
                     <a16:rowId xmlns:a16="http://schemas.microsoft.com/office/drawing/2014/main" val="3125091712"/>
+                  </a:ext>
+                </a:extLst>
+              </a:tr>
+              <a:tr h="243015">
+                <a:tc>
+                  <a:txBody>
+                    <a:bodyPr/>
+                    <a:lstStyle/>
+                    <a:p>
+                      <a:r>
+                        <a:rPr lang="tr-TR" sz="1100" dirty="0" smtClean="0"/>
+                        <a:t>machineIp</a:t>
+                      </a:r>
+                      <a:endParaRPr lang="tr-TR" sz="1100" dirty="0"/>
+                    </a:p>
+                  </a:txBody>
+                  <a:tcPr/>
+                </a:tc>
+                <a:tc>
+                  <a:txBody>
+                    <a:bodyPr/>
+                    <a:lstStyle/>
+                    <a:p>
+                      <a:r>
+                        <a:rPr lang="tr-TR" sz="1100" dirty="0" smtClean="0"/>
+                        <a:t>string</a:t>
+                      </a:r>
+                      <a:endParaRPr lang="tr-TR" sz="1100" dirty="0"/>
+                    </a:p>
+                  </a:txBody>
+                  <a:tcPr/>
+                </a:tc>
+                <a:extLst>
+                  <a:ext uri="{0D108BD9-81ED-4DB2-BD59-A6C34878D82A}">
+                    <a16:rowId xmlns:a16="http://schemas.microsoft.com/office/drawing/2014/main" val="3739673256"/>
                   </a:ext>
                 </a:extLst>
               </a:tr>
@@ -4327,15 +4367,15 @@
         </p:spPr>
         <p:style>
           <a:lnRef idx="2">
-            <a:schemeClr val="accent1">
+            <a:schemeClr val="accent4">
               <a:shade val="50000"/>
             </a:schemeClr>
           </a:lnRef>
           <a:fillRef idx="1">
-            <a:schemeClr val="accent1"/>
+            <a:schemeClr val="accent4"/>
           </a:fillRef>
           <a:effectRef idx="0">
-            <a:schemeClr val="accent1"/>
+            <a:schemeClr val="accent4"/>
           </a:effectRef>
           <a:fontRef idx="minor">
             <a:schemeClr val="lt1"/>
@@ -4398,6 +4438,204 @@
           </a:p>
         </p:txBody>
       </p:sp>
+      <p:cxnSp>
+        <p:nvCxnSpPr>
+          <p:cNvPr id="3" name="Gerader Verbinder 2"/>
+          <p:cNvCxnSpPr>
+            <a:stCxn id="10" idx="3"/>
+            <a:endCxn id="6" idx="1"/>
+          </p:cNvCxnSpPr>
+          <p:nvPr/>
+        </p:nvCxnSpPr>
+        <p:spPr>
+          <a:xfrm flipV="1">
+            <a:off x="2580640" y="4216400"/>
+            <a:ext cx="3200400" cy="1198880"/>
+          </a:xfrm>
+          <a:prstGeom prst="line">
+            <a:avLst/>
+          </a:prstGeom>
+        </p:spPr>
+        <p:style>
+          <a:lnRef idx="1">
+            <a:schemeClr val="accent1"/>
+          </a:lnRef>
+          <a:fillRef idx="0">
+            <a:schemeClr val="accent1"/>
+          </a:fillRef>
+          <a:effectRef idx="0">
+            <a:schemeClr val="accent1"/>
+          </a:effectRef>
+          <a:fontRef idx="minor">
+            <a:schemeClr val="tx1"/>
+          </a:fontRef>
+        </p:style>
+      </p:cxnSp>
+      <p:cxnSp>
+        <p:nvCxnSpPr>
+          <p:cNvPr id="11" name="Gerader Verbinder 10"/>
+          <p:cNvCxnSpPr>
+            <a:stCxn id="10" idx="3"/>
+            <a:endCxn id="8" idx="1"/>
+          </p:cNvCxnSpPr>
+          <p:nvPr/>
+        </p:nvCxnSpPr>
+        <p:spPr>
+          <a:xfrm flipV="1">
+            <a:off x="2580640" y="2722880"/>
+            <a:ext cx="3200400" cy="2692400"/>
+          </a:xfrm>
+          <a:prstGeom prst="line">
+            <a:avLst/>
+          </a:prstGeom>
+        </p:spPr>
+        <p:style>
+          <a:lnRef idx="1">
+            <a:schemeClr val="accent1"/>
+          </a:lnRef>
+          <a:fillRef idx="0">
+            <a:schemeClr val="accent1"/>
+          </a:fillRef>
+          <a:effectRef idx="0">
+            <a:schemeClr val="accent1"/>
+          </a:effectRef>
+          <a:fontRef idx="minor">
+            <a:schemeClr val="tx1"/>
+          </a:fontRef>
+        </p:style>
+      </p:cxnSp>
+      <p:cxnSp>
+        <p:nvCxnSpPr>
+          <p:cNvPr id="14" name="Gerader Verbinder 13"/>
+          <p:cNvCxnSpPr>
+            <a:stCxn id="10" idx="3"/>
+            <a:endCxn id="5" idx="1"/>
+          </p:cNvCxnSpPr>
+          <p:nvPr/>
+        </p:nvCxnSpPr>
+        <p:spPr>
+          <a:xfrm flipV="1">
+            <a:off x="2580640" y="1310640"/>
+            <a:ext cx="3200400" cy="4104640"/>
+          </a:xfrm>
+          <a:prstGeom prst="line">
+            <a:avLst/>
+          </a:prstGeom>
+        </p:spPr>
+        <p:style>
+          <a:lnRef idx="1">
+            <a:schemeClr val="accent1"/>
+          </a:lnRef>
+          <a:fillRef idx="0">
+            <a:schemeClr val="accent1"/>
+          </a:fillRef>
+          <a:effectRef idx="0">
+            <a:schemeClr val="accent1"/>
+          </a:effectRef>
+          <a:fontRef idx="minor">
+            <a:schemeClr val="tx1"/>
+          </a:fontRef>
+        </p:style>
+      </p:cxnSp>
+      <p:cxnSp>
+        <p:nvCxnSpPr>
+          <p:cNvPr id="17" name="Gerader Verbinder 16"/>
+          <p:cNvCxnSpPr>
+            <a:stCxn id="7" idx="1"/>
+            <a:endCxn id="9" idx="3"/>
+          </p:cNvCxnSpPr>
+          <p:nvPr/>
+        </p:nvCxnSpPr>
+        <p:spPr>
+          <a:xfrm flipH="1" flipV="1">
+            <a:off x="2580640" y="1310640"/>
+            <a:ext cx="3200400" cy="4399280"/>
+          </a:xfrm>
+          <a:prstGeom prst="line">
+            <a:avLst/>
+          </a:prstGeom>
+        </p:spPr>
+        <p:style>
+          <a:lnRef idx="1">
+            <a:schemeClr val="accent4"/>
+          </a:lnRef>
+          <a:fillRef idx="0">
+            <a:schemeClr val="accent4"/>
+          </a:fillRef>
+          <a:effectRef idx="0">
+            <a:schemeClr val="accent4"/>
+          </a:effectRef>
+          <a:fontRef idx="minor">
+            <a:schemeClr val="tx1"/>
+          </a:fontRef>
+        </p:style>
+      </p:cxnSp>
+      <p:cxnSp>
+        <p:nvCxnSpPr>
+          <p:cNvPr id="20" name="Gerader Verbinder 19"/>
+          <p:cNvCxnSpPr>
+            <a:stCxn id="6" idx="1"/>
+            <a:endCxn id="9" idx="3"/>
+          </p:cNvCxnSpPr>
+          <p:nvPr/>
+        </p:nvCxnSpPr>
+        <p:spPr>
+          <a:xfrm flipH="1" flipV="1">
+            <a:off x="2580640" y="1310640"/>
+            <a:ext cx="3200400" cy="2905760"/>
+          </a:xfrm>
+          <a:prstGeom prst="line">
+            <a:avLst/>
+          </a:prstGeom>
+        </p:spPr>
+        <p:style>
+          <a:lnRef idx="1">
+            <a:schemeClr val="accent4"/>
+          </a:lnRef>
+          <a:fillRef idx="0">
+            <a:schemeClr val="accent4"/>
+          </a:fillRef>
+          <a:effectRef idx="0">
+            <a:schemeClr val="accent4"/>
+          </a:effectRef>
+          <a:fontRef idx="minor">
+            <a:schemeClr val="tx1"/>
+          </a:fontRef>
+        </p:style>
+      </p:cxnSp>
+      <p:cxnSp>
+        <p:nvCxnSpPr>
+          <p:cNvPr id="23" name="Gerader Verbinder 22"/>
+          <p:cNvCxnSpPr>
+            <a:stCxn id="5" idx="1"/>
+            <a:endCxn id="9" idx="3"/>
+          </p:cNvCxnSpPr>
+          <p:nvPr/>
+        </p:nvCxnSpPr>
+        <p:spPr>
+          <a:xfrm flipH="1">
+            <a:off x="2580640" y="1310640"/>
+            <a:ext cx="3200400" cy="0"/>
+          </a:xfrm>
+          <a:prstGeom prst="line">
+            <a:avLst/>
+          </a:prstGeom>
+        </p:spPr>
+        <p:style>
+          <a:lnRef idx="1">
+            <a:schemeClr val="accent4"/>
+          </a:lnRef>
+          <a:fillRef idx="0">
+            <a:schemeClr val="accent4"/>
+          </a:fillRef>
+          <a:effectRef idx="0">
+            <a:schemeClr val="accent4"/>
+          </a:effectRef>
+          <a:fontRef idx="minor">
+            <a:schemeClr val="tx1"/>
+          </a:fontRef>
+        </p:style>
+      </p:cxnSp>
     </p:spTree>
     <p:extLst>
       <p:ext uri="{BB962C8B-B14F-4D97-AF65-F5344CB8AC3E}">

</xml_diff>